<commit_message>
Revert "Merge branch 'master' of https://github.com/euneirophrenia/Risiko"
This reverts commit 038b8fce9039a8718988ebb2acde82d11c08dae4, reversing
changes made to d83f2b4f5b1f19b7f053079c0a988b5cf224c1ed.
</commit_message>
<xml_diff>
--- a/Presentazione.pptx
+++ b/Presentazione.pptx
@@ -11,33 +11,32 @@
     <p:sldId id="259" r:id="rId5"/>
     <p:sldId id="260" r:id="rId6"/>
     <p:sldId id="261" r:id="rId7"/>
-    <p:sldId id="288" r:id="rId8"/>
-    <p:sldId id="262" r:id="rId9"/>
-    <p:sldId id="263" r:id="rId10"/>
-    <p:sldId id="264" r:id="rId11"/>
-    <p:sldId id="265" r:id="rId12"/>
-    <p:sldId id="266" r:id="rId13"/>
-    <p:sldId id="267" r:id="rId14"/>
-    <p:sldId id="268" r:id="rId15"/>
-    <p:sldId id="269" r:id="rId16"/>
-    <p:sldId id="270" r:id="rId17"/>
-    <p:sldId id="271" r:id="rId18"/>
-    <p:sldId id="272" r:id="rId19"/>
-    <p:sldId id="273" r:id="rId20"/>
-    <p:sldId id="274" r:id="rId21"/>
-    <p:sldId id="275" r:id="rId22"/>
-    <p:sldId id="276" r:id="rId23"/>
-    <p:sldId id="277" r:id="rId24"/>
-    <p:sldId id="278" r:id="rId25"/>
-    <p:sldId id="279" r:id="rId26"/>
-    <p:sldId id="280" r:id="rId27"/>
-    <p:sldId id="281" r:id="rId28"/>
-    <p:sldId id="282" r:id="rId29"/>
-    <p:sldId id="283" r:id="rId30"/>
-    <p:sldId id="284" r:id="rId31"/>
-    <p:sldId id="285" r:id="rId32"/>
-    <p:sldId id="286" r:id="rId33"/>
-    <p:sldId id="287" r:id="rId34"/>
+    <p:sldId id="262" r:id="rId8"/>
+    <p:sldId id="263" r:id="rId9"/>
+    <p:sldId id="264" r:id="rId10"/>
+    <p:sldId id="265" r:id="rId11"/>
+    <p:sldId id="266" r:id="rId12"/>
+    <p:sldId id="267" r:id="rId13"/>
+    <p:sldId id="268" r:id="rId14"/>
+    <p:sldId id="269" r:id="rId15"/>
+    <p:sldId id="270" r:id="rId16"/>
+    <p:sldId id="271" r:id="rId17"/>
+    <p:sldId id="272" r:id="rId18"/>
+    <p:sldId id="273" r:id="rId19"/>
+    <p:sldId id="274" r:id="rId20"/>
+    <p:sldId id="275" r:id="rId21"/>
+    <p:sldId id="276" r:id="rId22"/>
+    <p:sldId id="277" r:id="rId23"/>
+    <p:sldId id="278" r:id="rId24"/>
+    <p:sldId id="279" r:id="rId25"/>
+    <p:sldId id="280" r:id="rId26"/>
+    <p:sldId id="281" r:id="rId27"/>
+    <p:sldId id="282" r:id="rId28"/>
+    <p:sldId id="283" r:id="rId29"/>
+    <p:sldId id="284" r:id="rId30"/>
+    <p:sldId id="285" r:id="rId31"/>
+    <p:sldId id="286" r:id="rId32"/>
+    <p:sldId id="287" r:id="rId33"/>
   </p:sldIdLst>
   <p:sldSz cx="9144000" cy="6858000" type="screen4x3"/>
   <p:notesSz cx="6858000" cy="9144000"/>
@@ -320,8 +319,7 @@
           <a:p>
             <a:fld id="{E834DF73-60BE-4863-B2C1-944FC7617A51}" type="datetimeFigureOut">
               <a:rPr lang="it-IT" smtClean="0"/>
-              <a:pPr/>
-              <a:t>20/10/2015</a:t>
+              <a:t>18/10/2015</a:t>
             </a:fld>
             <a:endParaRPr lang="it-IT" dirty="0"/>
           </a:p>
@@ -363,7 +361,6 @@
           <a:p>
             <a:fld id="{B707B219-9253-4384-B2EB-353AB88F2079}" type="slidenum">
               <a:rPr lang="it-IT" smtClean="0"/>
-              <a:pPr/>
               <a:t>‹N›</a:t>
             </a:fld>
             <a:endParaRPr lang="it-IT" dirty="0"/>
@@ -487,8 +484,7 @@
           <a:p>
             <a:fld id="{E834DF73-60BE-4863-B2C1-944FC7617A51}" type="datetimeFigureOut">
               <a:rPr lang="it-IT" smtClean="0"/>
-              <a:pPr/>
-              <a:t>20/10/2015</a:t>
+              <a:t>18/10/2015</a:t>
             </a:fld>
             <a:endParaRPr lang="it-IT" dirty="0"/>
           </a:p>
@@ -530,7 +526,6 @@
           <a:p>
             <a:fld id="{B707B219-9253-4384-B2EB-353AB88F2079}" type="slidenum">
               <a:rPr lang="it-IT" smtClean="0"/>
-              <a:pPr/>
               <a:t>‹N›</a:t>
             </a:fld>
             <a:endParaRPr lang="it-IT" dirty="0"/>
@@ -664,8 +659,7 @@
           <a:p>
             <a:fld id="{E834DF73-60BE-4863-B2C1-944FC7617A51}" type="datetimeFigureOut">
               <a:rPr lang="it-IT" smtClean="0"/>
-              <a:pPr/>
-              <a:t>20/10/2015</a:t>
+              <a:t>18/10/2015</a:t>
             </a:fld>
             <a:endParaRPr lang="it-IT" dirty="0"/>
           </a:p>
@@ -707,7 +701,6 @@
           <a:p>
             <a:fld id="{B707B219-9253-4384-B2EB-353AB88F2079}" type="slidenum">
               <a:rPr lang="it-IT" smtClean="0"/>
-              <a:pPr/>
               <a:t>‹N›</a:t>
             </a:fld>
             <a:endParaRPr lang="it-IT" dirty="0"/>
@@ -831,8 +824,7 @@
           <a:p>
             <a:fld id="{E834DF73-60BE-4863-B2C1-944FC7617A51}" type="datetimeFigureOut">
               <a:rPr lang="it-IT" smtClean="0"/>
-              <a:pPr/>
-              <a:t>20/10/2015</a:t>
+              <a:t>18/10/2015</a:t>
             </a:fld>
             <a:endParaRPr lang="it-IT" dirty="0"/>
           </a:p>
@@ -874,7 +866,6 @@
           <a:p>
             <a:fld id="{B707B219-9253-4384-B2EB-353AB88F2079}" type="slidenum">
               <a:rPr lang="it-IT" smtClean="0"/>
-              <a:pPr/>
               <a:t>‹N›</a:t>
             </a:fld>
             <a:endParaRPr lang="it-IT" dirty="0"/>
@@ -1074,8 +1065,7 @@
           <a:p>
             <a:fld id="{E834DF73-60BE-4863-B2C1-944FC7617A51}" type="datetimeFigureOut">
               <a:rPr lang="it-IT" smtClean="0"/>
-              <a:pPr/>
-              <a:t>20/10/2015</a:t>
+              <a:t>18/10/2015</a:t>
             </a:fld>
             <a:endParaRPr lang="it-IT" dirty="0"/>
           </a:p>
@@ -1117,7 +1107,6 @@
           <a:p>
             <a:fld id="{B707B219-9253-4384-B2EB-353AB88F2079}" type="slidenum">
               <a:rPr lang="it-IT" smtClean="0"/>
-              <a:pPr/>
               <a:t>‹N›</a:t>
             </a:fld>
             <a:endParaRPr lang="it-IT" dirty="0"/>
@@ -1359,8 +1348,7 @@
           <a:p>
             <a:fld id="{E834DF73-60BE-4863-B2C1-944FC7617A51}" type="datetimeFigureOut">
               <a:rPr lang="it-IT" smtClean="0"/>
-              <a:pPr/>
-              <a:t>20/10/2015</a:t>
+              <a:t>18/10/2015</a:t>
             </a:fld>
             <a:endParaRPr lang="it-IT" dirty="0"/>
           </a:p>
@@ -1402,7 +1390,6 @@
           <a:p>
             <a:fld id="{B707B219-9253-4384-B2EB-353AB88F2079}" type="slidenum">
               <a:rPr lang="it-IT" smtClean="0"/>
-              <a:pPr/>
               <a:t>‹N›</a:t>
             </a:fld>
             <a:endParaRPr lang="it-IT" dirty="0"/>
@@ -1778,8 +1765,7 @@
           <a:p>
             <a:fld id="{E834DF73-60BE-4863-B2C1-944FC7617A51}" type="datetimeFigureOut">
               <a:rPr lang="it-IT" smtClean="0"/>
-              <a:pPr/>
-              <a:t>20/10/2015</a:t>
+              <a:t>18/10/2015</a:t>
             </a:fld>
             <a:endParaRPr lang="it-IT" dirty="0"/>
           </a:p>
@@ -1821,7 +1807,6 @@
           <a:p>
             <a:fld id="{B707B219-9253-4384-B2EB-353AB88F2079}" type="slidenum">
               <a:rPr lang="it-IT" smtClean="0"/>
-              <a:pPr/>
               <a:t>‹N›</a:t>
             </a:fld>
             <a:endParaRPr lang="it-IT" dirty="0"/>
@@ -1893,8 +1878,7 @@
           <a:p>
             <a:fld id="{E834DF73-60BE-4863-B2C1-944FC7617A51}" type="datetimeFigureOut">
               <a:rPr lang="it-IT" smtClean="0"/>
-              <a:pPr/>
-              <a:t>20/10/2015</a:t>
+              <a:t>18/10/2015</a:t>
             </a:fld>
             <a:endParaRPr lang="it-IT" dirty="0"/>
           </a:p>
@@ -1936,7 +1920,6 @@
           <a:p>
             <a:fld id="{B707B219-9253-4384-B2EB-353AB88F2079}" type="slidenum">
               <a:rPr lang="it-IT" smtClean="0"/>
-              <a:pPr/>
               <a:t>‹N›</a:t>
             </a:fld>
             <a:endParaRPr lang="it-IT" dirty="0"/>
@@ -1985,8 +1968,7 @@
           <a:p>
             <a:fld id="{E834DF73-60BE-4863-B2C1-944FC7617A51}" type="datetimeFigureOut">
               <a:rPr lang="it-IT" smtClean="0"/>
-              <a:pPr/>
-              <a:t>20/10/2015</a:t>
+              <a:t>18/10/2015</a:t>
             </a:fld>
             <a:endParaRPr lang="it-IT" dirty="0"/>
           </a:p>
@@ -2028,7 +2010,6 @@
           <a:p>
             <a:fld id="{B707B219-9253-4384-B2EB-353AB88F2079}" type="slidenum">
               <a:rPr lang="it-IT" smtClean="0"/>
-              <a:pPr/>
               <a:t>‹N›</a:t>
             </a:fld>
             <a:endParaRPr lang="it-IT" dirty="0"/>
@@ -2259,8 +2240,7 @@
           <a:p>
             <a:fld id="{E834DF73-60BE-4863-B2C1-944FC7617A51}" type="datetimeFigureOut">
               <a:rPr lang="it-IT" smtClean="0"/>
-              <a:pPr/>
-              <a:t>20/10/2015</a:t>
+              <a:t>18/10/2015</a:t>
             </a:fld>
             <a:endParaRPr lang="it-IT" dirty="0"/>
           </a:p>
@@ -2302,7 +2282,6 @@
           <a:p>
             <a:fld id="{B707B219-9253-4384-B2EB-353AB88F2079}" type="slidenum">
               <a:rPr lang="it-IT" smtClean="0"/>
-              <a:pPr/>
               <a:t>‹N›</a:t>
             </a:fld>
             <a:endParaRPr lang="it-IT" dirty="0"/>
@@ -2509,8 +2488,7 @@
           <a:p>
             <a:fld id="{E834DF73-60BE-4863-B2C1-944FC7617A51}" type="datetimeFigureOut">
               <a:rPr lang="it-IT" smtClean="0"/>
-              <a:pPr/>
-              <a:t>20/10/2015</a:t>
+              <a:t>18/10/2015</a:t>
             </a:fld>
             <a:endParaRPr lang="it-IT" dirty="0"/>
           </a:p>
@@ -2552,7 +2530,6 @@
           <a:p>
             <a:fld id="{B707B219-9253-4384-B2EB-353AB88F2079}" type="slidenum">
               <a:rPr lang="it-IT" smtClean="0"/>
-              <a:pPr/>
               <a:t>‹N›</a:t>
             </a:fld>
             <a:endParaRPr lang="it-IT" dirty="0"/>
@@ -2719,8 +2696,7 @@
           <a:p>
             <a:fld id="{E834DF73-60BE-4863-B2C1-944FC7617A51}" type="datetimeFigureOut">
               <a:rPr lang="it-IT" smtClean="0"/>
-              <a:pPr/>
-              <a:t>20/10/2015</a:t>
+              <a:t>18/10/2015</a:t>
             </a:fld>
             <a:endParaRPr lang="it-IT" dirty="0"/>
           </a:p>
@@ -2798,7 +2774,6 @@
           <a:p>
             <a:fld id="{B707B219-9253-4384-B2EB-353AB88F2079}" type="slidenum">
               <a:rPr lang="it-IT" smtClean="0"/>
-              <a:pPr/>
               <a:t>‹N›</a:t>
             </a:fld>
             <a:endParaRPr lang="it-IT" dirty="0"/>
@@ -3368,7 +3343,7 @@
       </p:sp>
       <p:pic>
         <p:nvPicPr>
-          <p:cNvPr id="3076" name="Picture 4"/>
+          <p:cNvPr id="5123" name="Picture 3"/>
           <p:cNvPicPr>
             <a:picLocks noGrp="1" noChangeAspect="1" noChangeArrowheads="1"/>
           </p:cNvPicPr>
@@ -3385,8 +3360,8 @@
         </p:blipFill>
         <p:spPr bwMode="auto">
           <a:xfrm>
-            <a:off x="2384561" y="1600200"/>
-            <a:ext cx="4374878" cy="4525963"/>
+            <a:off x="1484874" y="1600200"/>
+            <a:ext cx="6174252" cy="4525963"/>
           </a:xfrm>
           <a:prstGeom prst="rect">
             <a:avLst/>
@@ -3467,7 +3442,7 @@
       </p:sp>
       <p:pic>
         <p:nvPicPr>
-          <p:cNvPr id="5123" name="Picture 3"/>
+          <p:cNvPr id="6147" name="Picture 3"/>
           <p:cNvPicPr>
             <a:picLocks noGrp="1" noChangeAspect="1" noChangeArrowheads="1"/>
           </p:cNvPicPr>
@@ -3484,8 +3459,8 @@
         </p:blipFill>
         <p:spPr bwMode="auto">
           <a:xfrm>
-            <a:off x="1484874" y="1600200"/>
-            <a:ext cx="6174252" cy="4525963"/>
+            <a:off x="1366390" y="2177021"/>
+            <a:ext cx="6411220" cy="3372321"/>
           </a:xfrm>
           <a:prstGeom prst="rect">
             <a:avLst/>
@@ -3566,7 +3541,7 @@
       </p:sp>
       <p:pic>
         <p:nvPicPr>
-          <p:cNvPr id="6147" name="Picture 3"/>
+          <p:cNvPr id="4100" name="Picture 4"/>
           <p:cNvPicPr>
             <a:picLocks noGrp="1" noChangeAspect="1" noChangeArrowheads="1"/>
           </p:cNvPicPr>
@@ -3583,8 +3558,8 @@
         </p:blipFill>
         <p:spPr bwMode="auto">
           <a:xfrm>
-            <a:off x="1366390" y="2177021"/>
-            <a:ext cx="6411220" cy="3372321"/>
+            <a:off x="1617796" y="1600200"/>
+            <a:ext cx="5908407" cy="4525963"/>
           </a:xfrm>
           <a:prstGeom prst="rect">
             <a:avLst/>
@@ -3665,7 +3640,7 @@
       </p:sp>
       <p:pic>
         <p:nvPicPr>
-          <p:cNvPr id="4100" name="Picture 4"/>
+          <p:cNvPr id="7171" name="Picture 3"/>
           <p:cNvPicPr>
             <a:picLocks noGrp="1" noChangeAspect="1" noChangeArrowheads="1"/>
           </p:cNvPicPr>
@@ -3682,8 +3657,8 @@
         </p:blipFill>
         <p:spPr bwMode="auto">
           <a:xfrm>
-            <a:off x="1617796" y="1600200"/>
-            <a:ext cx="5908407" cy="4525963"/>
+            <a:off x="1323521" y="2100810"/>
+            <a:ext cx="6496957" cy="3524742"/>
           </a:xfrm>
           <a:prstGeom prst="rect">
             <a:avLst/>
@@ -3764,7 +3739,7 @@
       </p:sp>
       <p:pic>
         <p:nvPicPr>
-          <p:cNvPr id="7171" name="Picture 3"/>
+          <p:cNvPr id="8195" name="Picture 3"/>
           <p:cNvPicPr>
             <a:picLocks noGrp="1" noChangeAspect="1" noChangeArrowheads="1"/>
           </p:cNvPicPr>
@@ -3781,8 +3756,8 @@
         </p:blipFill>
         <p:spPr bwMode="auto">
           <a:xfrm>
-            <a:off x="1323521" y="2100810"/>
-            <a:ext cx="6496957" cy="3524742"/>
+            <a:off x="2483768" y="1484784"/>
+            <a:ext cx="4197239" cy="5373216"/>
           </a:xfrm>
           <a:prstGeom prst="rect">
             <a:avLst/>
@@ -3863,7 +3838,7 @@
       </p:sp>
       <p:pic>
         <p:nvPicPr>
-          <p:cNvPr id="8195" name="Picture 3"/>
+          <p:cNvPr id="9218" name="Picture 2"/>
           <p:cNvPicPr>
             <a:picLocks noGrp="1" noChangeAspect="1" noChangeArrowheads="1"/>
           </p:cNvPicPr>
@@ -3880,8 +3855,8 @@
         </p:blipFill>
         <p:spPr bwMode="auto">
           <a:xfrm>
-            <a:off x="2483768" y="1484784"/>
-            <a:ext cx="4197239" cy="5373216"/>
+            <a:off x="1778502" y="1600200"/>
+            <a:ext cx="5586995" cy="4525963"/>
           </a:xfrm>
           <a:prstGeom prst="rect">
             <a:avLst/>
@@ -3893,7 +3868,6 @@
             <a:headEnd/>
             <a:tailEnd/>
           </a:ln>
-          <a:effectLst/>
         </p:spPr>
       </p:pic>
     </p:spTree>
@@ -3949,12 +3923,14 @@
           </a:fontRef>
         </p:style>
         <p:txBody>
-          <a:bodyPr/>
+          <a:bodyPr>
+            <a:normAutofit fontScale="90000"/>
+          </a:bodyPr>
           <a:lstStyle/>
           <a:p>
             <a:r>
               <a:rPr lang="it-IT" dirty="0" smtClean="0"/>
-              <a:t>Scenari</a:t>
+              <a:t>Modello statico: diagramma delle classi</a:t>
             </a:r>
             <a:endParaRPr lang="it-IT" dirty="0"/>
           </a:p>
@@ -3962,7 +3938,7 @@
       </p:sp>
       <p:pic>
         <p:nvPicPr>
-          <p:cNvPr id="9218" name="Picture 2"/>
+          <p:cNvPr id="10243" name="Picture 3"/>
           <p:cNvPicPr>
             <a:picLocks noGrp="1" noChangeAspect="1" noChangeArrowheads="1"/>
           </p:cNvPicPr>
@@ -3979,8 +3955,8 @@
         </p:blipFill>
         <p:spPr bwMode="auto">
           <a:xfrm>
-            <a:off x="1778502" y="1600200"/>
-            <a:ext cx="5586995" cy="4525963"/>
+            <a:off x="1347787" y="1820069"/>
+            <a:ext cx="6448425" cy="4086225"/>
           </a:xfrm>
           <a:prstGeom prst="rect">
             <a:avLst/>
@@ -4062,7 +4038,7 @@
       </p:sp>
       <p:pic>
         <p:nvPicPr>
-          <p:cNvPr id="10243" name="Picture 3"/>
+          <p:cNvPr id="11266" name="Picture 2"/>
           <p:cNvPicPr>
             <a:picLocks noGrp="1" noChangeAspect="1" noChangeArrowheads="1"/>
           </p:cNvPicPr>
@@ -4079,8 +4055,8 @@
         </p:blipFill>
         <p:spPr bwMode="auto">
           <a:xfrm>
-            <a:off x="1347787" y="1820069"/>
-            <a:ext cx="6448425" cy="4086225"/>
+            <a:off x="2437698" y="1600200"/>
+            <a:ext cx="4268604" cy="4525963"/>
           </a:xfrm>
           <a:prstGeom prst="rect">
             <a:avLst/>
@@ -4154,7 +4130,7 @@
           <a:p>
             <a:r>
               <a:rPr lang="it-IT" dirty="0" smtClean="0"/>
-              <a:t>Modello statico: diagramma delle classi</a:t>
+              <a:t>Modello dinamico: diagramma di sequenza – Inizio Gioco</a:t>
             </a:r>
             <a:endParaRPr lang="it-IT" dirty="0"/>
           </a:p>
@@ -4162,9 +4138,9 @@
       </p:sp>
       <p:pic>
         <p:nvPicPr>
-          <p:cNvPr id="11266" name="Picture 2"/>
+          <p:cNvPr id="5" name="Segnaposto contenuto 4"/>
           <p:cNvPicPr>
-            <a:picLocks noGrp="1" noChangeAspect="1" noChangeArrowheads="1"/>
+            <a:picLocks noGrp="1"/>
           </p:cNvPicPr>
           <p:nvPr>
             <p:ph idx="1"/>
@@ -4179,8 +4155,8 @@
         </p:blipFill>
         <p:spPr bwMode="auto">
           <a:xfrm>
-            <a:off x="2437698" y="1600200"/>
-            <a:ext cx="4268604" cy="4525963"/>
+            <a:off x="683568" y="1556792"/>
+            <a:ext cx="7704856" cy="4896544"/>
           </a:xfrm>
           <a:prstGeom prst="rect">
             <a:avLst/>
@@ -4254,7 +4230,7 @@
           <a:p>
             <a:r>
               <a:rPr lang="it-IT" dirty="0" smtClean="0"/>
-              <a:t>Modello dinamico: diagramma di sequenza – Inizio Gioco</a:t>
+              <a:t>Modello dinamico: diagramma di sequenza – Aggiunta Armate</a:t>
             </a:r>
             <a:endParaRPr lang="it-IT" dirty="0"/>
           </a:p>
@@ -4262,9 +4238,9 @@
       </p:sp>
       <p:pic>
         <p:nvPicPr>
-          <p:cNvPr id="5" name="Segnaposto contenuto 4"/>
+          <p:cNvPr id="22530" name="Picture 2"/>
           <p:cNvPicPr>
-            <a:picLocks noGrp="1"/>
+            <a:picLocks noGrp="1" noChangeAspect="1" noChangeArrowheads="1"/>
           </p:cNvPicPr>
           <p:nvPr>
             <p:ph idx="1"/>
@@ -4279,8 +4255,8 @@
         </p:blipFill>
         <p:spPr bwMode="auto">
           <a:xfrm>
-            <a:off x="683568" y="1556792"/>
-            <a:ext cx="7704856" cy="4896544"/>
+            <a:off x="3203848" y="1556792"/>
+            <a:ext cx="2875535" cy="5039098"/>
           </a:xfrm>
           <a:prstGeom prst="rect">
             <a:avLst/>
@@ -4478,7 +4454,7 @@
           <a:p>
             <a:r>
               <a:rPr lang="it-IT" dirty="0" smtClean="0"/>
-              <a:t>Modello dinamico: diagramma di sequenza – Aggiunta Armate</a:t>
+              <a:t>Modello dinamico: diagramma di sequenza – Cambio fase</a:t>
             </a:r>
             <a:endParaRPr lang="it-IT" dirty="0"/>
           </a:p>
@@ -4486,9 +4462,9 @@
       </p:sp>
       <p:pic>
         <p:nvPicPr>
-          <p:cNvPr id="22530" name="Picture 2"/>
+          <p:cNvPr id="7" name="Segnaposto contenuto 6"/>
           <p:cNvPicPr>
-            <a:picLocks noGrp="1" noChangeAspect="1" noChangeArrowheads="1"/>
+            <a:picLocks noGrp="1"/>
           </p:cNvPicPr>
           <p:nvPr>
             <p:ph idx="1"/>
@@ -4503,8 +4479,8 @@
         </p:blipFill>
         <p:spPr bwMode="auto">
           <a:xfrm>
-            <a:off x="3203848" y="1556792"/>
-            <a:ext cx="2875535" cy="5039098"/>
+            <a:off x="1043608" y="1628800"/>
+            <a:ext cx="7272808" cy="5240566"/>
           </a:xfrm>
           <a:prstGeom prst="rect">
             <a:avLst/>
@@ -4578,7 +4554,7 @@
           <a:p>
             <a:r>
               <a:rPr lang="it-IT" dirty="0" smtClean="0"/>
-              <a:t>Modello dinamico: diagramma di sequenza – Cambio fase</a:t>
+              <a:t>Modello dinamico: diagramma di sequenza – Attacco</a:t>
             </a:r>
             <a:endParaRPr lang="it-IT" dirty="0"/>
           </a:p>
@@ -4586,9 +4562,9 @@
       </p:sp>
       <p:pic>
         <p:nvPicPr>
-          <p:cNvPr id="7" name="Segnaposto contenuto 6"/>
+          <p:cNvPr id="12290" name="Picture 2"/>
           <p:cNvPicPr>
-            <a:picLocks noGrp="1"/>
+            <a:picLocks noGrp="1" noChangeAspect="1" noChangeArrowheads="1"/>
           </p:cNvPicPr>
           <p:nvPr>
             <p:ph idx="1"/>
@@ -4603,8 +4579,8 @@
         </p:blipFill>
         <p:spPr bwMode="auto">
           <a:xfrm>
-            <a:off x="1043608" y="1628800"/>
-            <a:ext cx="7272808" cy="5240566"/>
+            <a:off x="1835696" y="1484784"/>
+            <a:ext cx="5007604" cy="5152621"/>
           </a:xfrm>
           <a:prstGeom prst="rect">
             <a:avLst/>
@@ -4678,7 +4654,7 @@
           <a:p>
             <a:r>
               <a:rPr lang="it-IT" dirty="0" smtClean="0"/>
-              <a:t>Modello dinamico: diagramma di sequenza – Attacco</a:t>
+              <a:t>Modello dinamico: diagramma di sequenza – Spostamento</a:t>
             </a:r>
             <a:endParaRPr lang="it-IT" dirty="0"/>
           </a:p>
@@ -4686,7 +4662,7 @@
       </p:sp>
       <p:pic>
         <p:nvPicPr>
-          <p:cNvPr id="12290" name="Picture 2"/>
+          <p:cNvPr id="13314" name="Picture 2"/>
           <p:cNvPicPr>
             <a:picLocks noGrp="1" noChangeAspect="1" noChangeArrowheads="1"/>
           </p:cNvPicPr>
@@ -4703,8 +4679,8 @@
         </p:blipFill>
         <p:spPr bwMode="auto">
           <a:xfrm>
-            <a:off x="1835696" y="1484784"/>
-            <a:ext cx="5007604" cy="5152621"/>
+            <a:off x="1905468" y="1600200"/>
+            <a:ext cx="5718579" cy="4853136"/>
           </a:xfrm>
           <a:prstGeom prst="rect">
             <a:avLst/>
@@ -4772,13 +4748,13 @@
         </p:style>
         <p:txBody>
           <a:bodyPr>
-            <a:normAutofit fontScale="90000"/>
+            <a:normAutofit/>
           </a:bodyPr>
           <a:lstStyle/>
           <a:p>
             <a:r>
               <a:rPr lang="it-IT" dirty="0" smtClean="0"/>
-              <a:t>Modello dinamico: diagramma di sequenza – Spostamento</a:t>
+              <a:t>Progettazione – Stati e giocatori</a:t>
             </a:r>
             <a:endParaRPr lang="it-IT" dirty="0"/>
           </a:p>
@@ -4786,7 +4762,7 @@
       </p:sp>
       <p:pic>
         <p:nvPicPr>
-          <p:cNvPr id="13314" name="Picture 2"/>
+          <p:cNvPr id="14338" name="Picture 2"/>
           <p:cNvPicPr>
             <a:picLocks noGrp="1" noChangeAspect="1" noChangeArrowheads="1"/>
           </p:cNvPicPr>
@@ -4803,8 +4779,8 @@
         </p:blipFill>
         <p:spPr bwMode="auto">
           <a:xfrm>
-            <a:off x="1905468" y="1600200"/>
-            <a:ext cx="5718579" cy="4853136"/>
+            <a:off x="2123728" y="1556792"/>
+            <a:ext cx="4392488" cy="5174712"/>
           </a:xfrm>
           <a:prstGeom prst="rect">
             <a:avLst/>
@@ -4878,106 +4854,6 @@
           <a:p>
             <a:r>
               <a:rPr lang="it-IT" dirty="0" smtClean="0"/>
-              <a:t>Progettazione – Stati e giocatori</a:t>
-            </a:r>
-            <a:endParaRPr lang="it-IT" dirty="0"/>
-          </a:p>
-        </p:txBody>
-      </p:sp>
-      <p:pic>
-        <p:nvPicPr>
-          <p:cNvPr id="14338" name="Picture 2"/>
-          <p:cNvPicPr>
-            <a:picLocks noGrp="1" noChangeAspect="1" noChangeArrowheads="1"/>
-          </p:cNvPicPr>
-          <p:nvPr>
-            <p:ph idx="1"/>
-          </p:nvPr>
-        </p:nvPicPr>
-        <p:blipFill>
-          <a:blip r:embed="rId2" cstate="print"/>
-          <a:srcRect/>
-          <a:stretch>
-            <a:fillRect/>
-          </a:stretch>
-        </p:blipFill>
-        <p:spPr bwMode="auto">
-          <a:xfrm>
-            <a:off x="2123728" y="1556792"/>
-            <a:ext cx="4392488" cy="5174712"/>
-          </a:xfrm>
-          <a:prstGeom prst="rect">
-            <a:avLst/>
-          </a:prstGeom>
-          <a:noFill/>
-          <a:ln w="9525">
-            <a:noFill/>
-            <a:miter lim="800000"/>
-            <a:headEnd/>
-            <a:tailEnd/>
-          </a:ln>
-        </p:spPr>
-      </p:pic>
-    </p:spTree>
-  </p:cSld>
-  <p:clrMapOvr>
-    <a:masterClrMapping/>
-  </p:clrMapOvr>
-</p:sld>
-</file>
-
-<file path=ppt/slides/slide25.xml><?xml version="1.0" encoding="utf-8"?>
-<p:sld xmlns:a="http://schemas.openxmlformats.org/drawingml/2006/main" xmlns:r="http://schemas.openxmlformats.org/officeDocument/2006/relationships" xmlns:p="http://schemas.openxmlformats.org/presentationml/2006/main">
-  <p:cSld>
-    <p:spTree>
-      <p:nvGrpSpPr>
-        <p:cNvPr id="1" name=""/>
-        <p:cNvGrpSpPr/>
-        <p:nvPr/>
-      </p:nvGrpSpPr>
-      <p:grpSpPr>
-        <a:xfrm>
-          <a:off x="0" y="0"/>
-          <a:ext cx="0" cy="0"/>
-          <a:chOff x="0" y="0"/>
-          <a:chExt cx="0" cy="0"/>
-        </a:xfrm>
-      </p:grpSpPr>
-      <p:sp>
-        <p:nvSpPr>
-          <p:cNvPr id="2" name="Titolo 1"/>
-          <p:cNvSpPr>
-            <a:spLocks noGrp="1"/>
-          </p:cNvSpPr>
-          <p:nvPr>
-            <p:ph type="title"/>
-          </p:nvPr>
-        </p:nvSpPr>
-        <p:spPr/>
-        <p:style>
-          <a:lnRef idx="2">
-            <a:schemeClr val="accent1">
-              <a:shade val="50000"/>
-            </a:schemeClr>
-          </a:lnRef>
-          <a:fillRef idx="1">
-            <a:schemeClr val="accent1"/>
-          </a:fillRef>
-          <a:effectRef idx="0">
-            <a:schemeClr val="accent1"/>
-          </a:effectRef>
-          <a:fontRef idx="minor">
-            <a:schemeClr val="lt1"/>
-          </a:fontRef>
-        </p:style>
-        <p:txBody>
-          <a:bodyPr>
-            <a:normAutofit/>
-          </a:bodyPr>
-          <a:lstStyle/>
-          <a:p>
-            <a:r>
-              <a:rPr lang="it-IT" dirty="0" smtClean="0"/>
               <a:t>Progettazione – Unity</a:t>
             </a:r>
             <a:endParaRPr lang="it-IT" dirty="0"/>
@@ -5027,6 +4903,106 @@
 </p:sld>
 </file>
 
+<file path=ppt/slides/slide25.xml><?xml version="1.0" encoding="utf-8"?>
+<p:sld xmlns:a="http://schemas.openxmlformats.org/drawingml/2006/main" xmlns:r="http://schemas.openxmlformats.org/officeDocument/2006/relationships" xmlns:p="http://schemas.openxmlformats.org/presentationml/2006/main">
+  <p:cSld>
+    <p:spTree>
+      <p:nvGrpSpPr>
+        <p:cNvPr id="1" name=""/>
+        <p:cNvGrpSpPr/>
+        <p:nvPr/>
+      </p:nvGrpSpPr>
+      <p:grpSpPr>
+        <a:xfrm>
+          <a:off x="0" y="0"/>
+          <a:ext cx="0" cy="0"/>
+          <a:chOff x="0" y="0"/>
+          <a:chExt cx="0" cy="0"/>
+        </a:xfrm>
+      </p:grpSpPr>
+      <p:sp>
+        <p:nvSpPr>
+          <p:cNvPr id="2" name="Titolo 1"/>
+          <p:cNvSpPr>
+            <a:spLocks noGrp="1"/>
+          </p:cNvSpPr>
+          <p:nvPr>
+            <p:ph type="title"/>
+          </p:nvPr>
+        </p:nvSpPr>
+        <p:spPr/>
+        <p:style>
+          <a:lnRef idx="2">
+            <a:schemeClr val="accent1">
+              <a:shade val="50000"/>
+            </a:schemeClr>
+          </a:lnRef>
+          <a:fillRef idx="1">
+            <a:schemeClr val="accent1"/>
+          </a:fillRef>
+          <a:effectRef idx="0">
+            <a:schemeClr val="accent1"/>
+          </a:effectRef>
+          <a:fontRef idx="minor">
+            <a:schemeClr val="lt1"/>
+          </a:fontRef>
+        </p:style>
+        <p:txBody>
+          <a:bodyPr>
+            <a:normAutofit/>
+          </a:bodyPr>
+          <a:lstStyle/>
+          <a:p>
+            <a:r>
+              <a:rPr lang="it-IT" dirty="0" smtClean="0"/>
+              <a:t>Progettazione – Main Manager </a:t>
+            </a:r>
+            <a:endParaRPr lang="it-IT" dirty="0"/>
+          </a:p>
+        </p:txBody>
+      </p:sp>
+      <p:pic>
+        <p:nvPicPr>
+          <p:cNvPr id="16386" name="Picture 2"/>
+          <p:cNvPicPr>
+            <a:picLocks noGrp="1" noChangeAspect="1" noChangeArrowheads="1"/>
+          </p:cNvPicPr>
+          <p:nvPr>
+            <p:ph idx="1"/>
+          </p:nvPr>
+        </p:nvPicPr>
+        <p:blipFill>
+          <a:blip r:embed="rId2" cstate="print"/>
+          <a:srcRect/>
+          <a:stretch>
+            <a:fillRect/>
+          </a:stretch>
+        </p:blipFill>
+        <p:spPr bwMode="auto">
+          <a:xfrm>
+            <a:off x="2077289" y="1600200"/>
+            <a:ext cx="4989422" cy="4525963"/>
+          </a:xfrm>
+          <a:prstGeom prst="rect">
+            <a:avLst/>
+          </a:prstGeom>
+          <a:noFill/>
+          <a:ln w="9525">
+            <a:noFill/>
+            <a:miter lim="800000"/>
+            <a:headEnd/>
+            <a:tailEnd/>
+          </a:ln>
+        </p:spPr>
+      </p:pic>
+    </p:spTree>
+  </p:cSld>
+  <p:clrMapOvr>
+    <a:masterClrMapping/>
+  </p:clrMapOvr>
+</p:sld>
+</file>
+
 <file path=ppt/slides/slide26.xml><?xml version="1.0" encoding="utf-8"?>
 <p:sld xmlns:a="http://schemas.openxmlformats.org/drawingml/2006/main" xmlns:r="http://schemas.openxmlformats.org/officeDocument/2006/relationships" xmlns:p="http://schemas.openxmlformats.org/presentationml/2006/main">
   <p:cSld>
@@ -5079,7 +5055,7 @@
           <a:p>
             <a:r>
               <a:rPr lang="it-IT" dirty="0" smtClean="0"/>
-              <a:t>Progettazione – Main Manager </a:t>
+              <a:t>Progettazione – Obiettivi Segreti </a:t>
             </a:r>
             <a:endParaRPr lang="it-IT" dirty="0"/>
           </a:p>
@@ -5087,7 +5063,7 @@
       </p:sp>
       <p:pic>
         <p:nvPicPr>
-          <p:cNvPr id="16386" name="Picture 2"/>
+          <p:cNvPr id="17410" name="Picture 2"/>
           <p:cNvPicPr>
             <a:picLocks noGrp="1" noChangeAspect="1" noChangeArrowheads="1"/>
           </p:cNvPicPr>
@@ -5104,8 +5080,8 @@
         </p:blipFill>
         <p:spPr bwMode="auto">
           <a:xfrm>
-            <a:off x="2077289" y="1600200"/>
-            <a:ext cx="4989422" cy="4525963"/>
+            <a:off x="1475656" y="1537182"/>
+            <a:ext cx="5986515" cy="5204186"/>
           </a:xfrm>
           <a:prstGeom prst="rect">
             <a:avLst/>
@@ -5179,7 +5155,7 @@
           <a:p>
             <a:r>
               <a:rPr lang="it-IT" dirty="0" smtClean="0"/>
-              <a:t>Progettazione – Obiettivi Segreti </a:t>
+              <a:t>Progettazione – Phase Manager </a:t>
             </a:r>
             <a:endParaRPr lang="it-IT" dirty="0"/>
           </a:p>
@@ -5187,7 +5163,7 @@
       </p:sp>
       <p:pic>
         <p:nvPicPr>
-          <p:cNvPr id="17410" name="Picture 2"/>
+          <p:cNvPr id="18434" name="Picture 2"/>
           <p:cNvPicPr>
             <a:picLocks noGrp="1" noChangeAspect="1" noChangeArrowheads="1"/>
           </p:cNvPicPr>
@@ -5204,8 +5180,8 @@
         </p:blipFill>
         <p:spPr bwMode="auto">
           <a:xfrm>
-            <a:off x="1475656" y="1537182"/>
-            <a:ext cx="5986515" cy="5204186"/>
+            <a:off x="2051720" y="1556792"/>
+            <a:ext cx="5323071" cy="5081113"/>
           </a:xfrm>
           <a:prstGeom prst="rect">
             <a:avLst/>
@@ -5279,7 +5255,7 @@
           <a:p>
             <a:r>
               <a:rPr lang="it-IT" dirty="0" smtClean="0"/>
-              <a:t>Progettazione – Phase Manager </a:t>
+              <a:t>Progettazione – Preturno Manager </a:t>
             </a:r>
             <a:endParaRPr lang="it-IT" dirty="0"/>
           </a:p>
@@ -5287,7 +5263,7 @@
       </p:sp>
       <p:pic>
         <p:nvPicPr>
-          <p:cNvPr id="18434" name="Picture 2"/>
+          <p:cNvPr id="19458" name="Picture 2"/>
           <p:cNvPicPr>
             <a:picLocks noGrp="1" noChangeAspect="1" noChangeArrowheads="1"/>
           </p:cNvPicPr>
@@ -5304,8 +5280,8 @@
         </p:blipFill>
         <p:spPr bwMode="auto">
           <a:xfrm>
-            <a:off x="2051720" y="1556792"/>
-            <a:ext cx="5323071" cy="5081113"/>
+            <a:off x="1309687" y="2286794"/>
+            <a:ext cx="6524625" cy="3152775"/>
           </a:xfrm>
           <a:prstGeom prst="rect">
             <a:avLst/>
@@ -5373,13 +5349,13 @@
         </p:style>
         <p:txBody>
           <a:bodyPr>
-            <a:normAutofit/>
+            <a:normAutofit fontScale="90000"/>
           </a:bodyPr>
           <a:lstStyle/>
           <a:p>
             <a:r>
               <a:rPr lang="it-IT" dirty="0" smtClean="0"/>
-              <a:t>Progettazione – Preturno Manager </a:t>
+              <a:t>Progettazione – Attack/Move Manager </a:t>
             </a:r>
             <a:endParaRPr lang="it-IT" dirty="0"/>
           </a:p>
@@ -5387,7 +5363,7 @@
       </p:sp>
       <p:pic>
         <p:nvPicPr>
-          <p:cNvPr id="19458" name="Picture 2"/>
+          <p:cNvPr id="20482" name="Picture 2"/>
           <p:cNvPicPr>
             <a:picLocks noGrp="1" noChangeAspect="1" noChangeArrowheads="1"/>
           </p:cNvPicPr>
@@ -5404,8 +5380,8 @@
         </p:blipFill>
         <p:spPr bwMode="auto">
           <a:xfrm>
-            <a:off x="1309687" y="2286794"/>
-            <a:ext cx="6524625" cy="3152775"/>
+            <a:off x="1835696" y="1484784"/>
+            <a:ext cx="5184576" cy="5314028"/>
           </a:xfrm>
           <a:prstGeom prst="rect">
             <a:avLst/>
@@ -5605,13 +5581,13 @@
         </p:style>
         <p:txBody>
           <a:bodyPr>
-            <a:normAutofit fontScale="90000"/>
+            <a:normAutofit/>
           </a:bodyPr>
           <a:lstStyle/>
           <a:p>
             <a:r>
               <a:rPr lang="it-IT" dirty="0" smtClean="0"/>
-              <a:t>Progettazione – Attack/Move Manager </a:t>
+              <a:t>Progettazione – Select Manager </a:t>
             </a:r>
             <a:endParaRPr lang="it-IT" dirty="0"/>
           </a:p>
@@ -5619,7 +5595,7 @@
       </p:sp>
       <p:pic>
         <p:nvPicPr>
-          <p:cNvPr id="20482" name="Picture 2"/>
+          <p:cNvPr id="21506" name="Picture 2"/>
           <p:cNvPicPr>
             <a:picLocks noGrp="1" noChangeAspect="1" noChangeArrowheads="1"/>
           </p:cNvPicPr>
@@ -5636,8 +5612,8 @@
         </p:blipFill>
         <p:spPr bwMode="auto">
           <a:xfrm>
-            <a:off x="1835696" y="1484784"/>
-            <a:ext cx="5184576" cy="5314028"/>
+            <a:off x="2627784" y="1556792"/>
+            <a:ext cx="4248472" cy="5169902"/>
           </a:xfrm>
           <a:prstGeom prst="rect">
             <a:avLst/>
@@ -5705,52 +5681,94 @@
         </p:style>
         <p:txBody>
           <a:bodyPr>
-            <a:normAutofit/>
+            <a:normAutofit fontScale="90000"/>
           </a:bodyPr>
           <a:lstStyle/>
           <a:p>
             <a:r>
               <a:rPr lang="it-IT" dirty="0" smtClean="0"/>
-              <a:t>Progettazione – Select Manager </a:t>
-            </a:r>
-            <a:endParaRPr lang="it-IT" dirty="0"/>
-          </a:p>
-        </p:txBody>
-      </p:sp>
-      <p:pic>
-        <p:nvPicPr>
-          <p:cNvPr id="21506" name="Picture 2"/>
-          <p:cNvPicPr>
-            <a:picLocks noGrp="1" noChangeAspect="1" noChangeArrowheads="1"/>
-          </p:cNvPicPr>
+              <a:t>Design Pattern e principi di progettazione </a:t>
+            </a:r>
+            <a:endParaRPr lang="it-IT" dirty="0"/>
+          </a:p>
+        </p:txBody>
+      </p:sp>
+      <p:sp>
+        <p:nvSpPr>
+          <p:cNvPr id="4" name="Segnaposto contenuto 3"/>
+          <p:cNvSpPr>
+            <a:spLocks noGrp="1"/>
+          </p:cNvSpPr>
           <p:nvPr>
             <p:ph idx="1"/>
           </p:nvPr>
-        </p:nvPicPr>
-        <p:blipFill>
-          <a:blip r:embed="rId2" cstate="print"/>
-          <a:srcRect/>
-          <a:stretch>
-            <a:fillRect/>
-          </a:stretch>
-        </p:blipFill>
-        <p:spPr bwMode="auto">
-          <a:xfrm>
-            <a:off x="2627784" y="1556792"/>
-            <a:ext cx="4248472" cy="5169902"/>
-          </a:xfrm>
-          <a:prstGeom prst="rect">
-            <a:avLst/>
-          </a:prstGeom>
-          <a:noFill/>
-          <a:ln w="9525">
-            <a:noFill/>
-            <a:miter lim="800000"/>
-            <a:headEnd/>
-            <a:tailEnd/>
-          </a:ln>
-        </p:spPr>
-      </p:pic>
+        </p:nvSpPr>
+        <p:spPr/>
+        <p:txBody>
+          <a:bodyPr>
+            <a:normAutofit fontScale="70000" lnSpcReduction="20000"/>
+          </a:bodyPr>
+          <a:lstStyle/>
+          <a:p>
+            <a:pPr>
+              <a:buNone/>
+            </a:pPr>
+            <a:r>
+              <a:rPr lang="it-IT" dirty="0"/>
+              <a:t>Al fine di garantire flessibilità nella realizzazione degli obiettivi segreti, è stato applicato il pattern </a:t>
+            </a:r>
+            <a:r>
+              <a:rPr lang="it-IT" b="1" dirty="0"/>
+              <a:t>Strategy</a:t>
+            </a:r>
+            <a:r>
+              <a:rPr lang="it-IT" dirty="0"/>
+              <a:t> realizzando un'interfaccia SecretGoal. Quest'ultima è implementata da tutte le classi che rappresentano un tipo di obiettivo segreto, permettendo così una facile estensione a nuove tipologie in caso di necessità, pur rispettando il </a:t>
+            </a:r>
+            <a:r>
+              <a:rPr lang="it-IT" b="1" dirty="0"/>
+              <a:t>design </a:t>
+            </a:r>
+            <a:r>
+              <a:rPr lang="it-IT" b="1" dirty="0" smtClean="0"/>
+              <a:t>principle Open/Closed </a:t>
+            </a:r>
+            <a:r>
+              <a:rPr lang="it-IT" dirty="0" smtClean="0"/>
+              <a:t>. </a:t>
+            </a:r>
+            <a:endParaRPr lang="it-IT" dirty="0"/>
+          </a:p>
+          <a:p>
+            <a:pPr>
+              <a:buNone/>
+            </a:pPr>
+            <a:r>
+              <a:rPr lang="it-IT" dirty="0"/>
+              <a:t>Per ovviare a simili problemi incontrati nella concretizzazione del SelectManager, è stato nuovamente applicato il pattern </a:t>
+            </a:r>
+            <a:r>
+              <a:rPr lang="it-IT" b="1" dirty="0"/>
+              <a:t>Strategy</a:t>
+            </a:r>
+            <a:r>
+              <a:rPr lang="it-IT" dirty="0"/>
+              <a:t> al fine di implementare diverse logiche di selezione dei territori. SelectAttack e SelectMove sono quindi due classi concrete che implementano i metodi IsAValidFirst() e IsAValidSecond() della classe astratta SelectManager, permettendo una facile espansione in caso di bisogno. In entrambi i casi sopracitati si è garantito il </a:t>
+            </a:r>
+            <a:r>
+              <a:rPr lang="it-IT" b="1" dirty="0"/>
+              <a:t>Dependency Inversion Principle</a:t>
+            </a:r>
+            <a:r>
+              <a:rPr lang="it-IT" dirty="0"/>
+              <a:t> in modo da eliminare la dipendenza da classi concrete fornendo interfacce stabili, le quali rendono i moduli maggiormente riusabili e facilmente estendibili.</a:t>
+            </a:r>
+          </a:p>
+          <a:p>
+            <a:endParaRPr lang="it-IT" dirty="0"/>
+          </a:p>
+        </p:txBody>
+      </p:sp>
     </p:spTree>
   </p:cSld>
   <p:clrMapOvr>
@@ -5830,148 +5848,6 @@
         <p:spPr/>
         <p:txBody>
           <a:bodyPr>
-            <a:normAutofit fontScale="70000" lnSpcReduction="20000"/>
-          </a:bodyPr>
-          <a:lstStyle/>
-          <a:p>
-            <a:pPr>
-              <a:buNone/>
-            </a:pPr>
-            <a:r>
-              <a:rPr lang="it-IT" dirty="0"/>
-              <a:t>Al fine di garantire flessibilità nella realizzazione degli obiettivi segreti, è stato applicato il pattern </a:t>
-            </a:r>
-            <a:r>
-              <a:rPr lang="it-IT" b="1" dirty="0"/>
-              <a:t>Strategy</a:t>
-            </a:r>
-            <a:r>
-              <a:rPr lang="it-IT" dirty="0"/>
-              <a:t> realizzando un'interfaccia SecretGoal. Quest'ultima è implementata da tutte le classi che rappresentano un tipo di obiettivo segreto, permettendo così una facile estensione a nuove tipologie in caso di necessità, pur rispettando il </a:t>
-            </a:r>
-            <a:r>
-              <a:rPr lang="it-IT" b="1" dirty="0"/>
-              <a:t>design </a:t>
-            </a:r>
-            <a:r>
-              <a:rPr lang="it-IT" b="1" dirty="0" smtClean="0"/>
-              <a:t>principle Open/Closed </a:t>
-            </a:r>
-            <a:r>
-              <a:rPr lang="it-IT" dirty="0" smtClean="0"/>
-              <a:t>. </a:t>
-            </a:r>
-            <a:endParaRPr lang="it-IT" dirty="0"/>
-          </a:p>
-          <a:p>
-            <a:pPr>
-              <a:buNone/>
-            </a:pPr>
-            <a:r>
-              <a:rPr lang="it-IT" dirty="0"/>
-              <a:t>Per ovviare a simili problemi incontrati nella concretizzazione del SelectManager, è stato nuovamente applicato il pattern </a:t>
-            </a:r>
-            <a:r>
-              <a:rPr lang="it-IT" b="1" dirty="0"/>
-              <a:t>Strategy</a:t>
-            </a:r>
-            <a:r>
-              <a:rPr lang="it-IT" dirty="0"/>
-              <a:t> al fine di implementare diverse logiche di selezione dei territori. SelectAttack e SelectMove sono quindi due classi concrete che implementano i metodi IsAValidFirst() e IsAValidSecond() della classe astratta SelectManager, permettendo una facile espansione in caso di bisogno. In entrambi i casi sopracitati si è garantito il </a:t>
-            </a:r>
-            <a:r>
-              <a:rPr lang="it-IT" b="1" dirty="0"/>
-              <a:t>Dependency Inversion Principle</a:t>
-            </a:r>
-            <a:r>
-              <a:rPr lang="it-IT" dirty="0"/>
-              <a:t> in modo da eliminare la dipendenza da classi concrete fornendo interfacce stabili, le quali rendono i moduli maggiormente riusabili e facilmente estendibili.</a:t>
-            </a:r>
-          </a:p>
-          <a:p>
-            <a:endParaRPr lang="it-IT" dirty="0"/>
-          </a:p>
-        </p:txBody>
-      </p:sp>
-    </p:spTree>
-  </p:cSld>
-  <p:clrMapOvr>
-    <a:masterClrMapping/>
-  </p:clrMapOvr>
-</p:sld>
-</file>
-
-<file path=ppt/slides/slide33.xml><?xml version="1.0" encoding="utf-8"?>
-<p:sld xmlns:a="http://schemas.openxmlformats.org/drawingml/2006/main" xmlns:r="http://schemas.openxmlformats.org/officeDocument/2006/relationships" xmlns:p="http://schemas.openxmlformats.org/presentationml/2006/main">
-  <p:cSld>
-    <p:spTree>
-      <p:nvGrpSpPr>
-        <p:cNvPr id="1" name=""/>
-        <p:cNvGrpSpPr/>
-        <p:nvPr/>
-      </p:nvGrpSpPr>
-      <p:grpSpPr>
-        <a:xfrm>
-          <a:off x="0" y="0"/>
-          <a:ext cx="0" cy="0"/>
-          <a:chOff x="0" y="0"/>
-          <a:chExt cx="0" cy="0"/>
-        </a:xfrm>
-      </p:grpSpPr>
-      <p:sp>
-        <p:nvSpPr>
-          <p:cNvPr id="2" name="Titolo 1"/>
-          <p:cNvSpPr>
-            <a:spLocks noGrp="1"/>
-          </p:cNvSpPr>
-          <p:nvPr>
-            <p:ph type="title"/>
-          </p:nvPr>
-        </p:nvSpPr>
-        <p:spPr/>
-        <p:style>
-          <a:lnRef idx="2">
-            <a:schemeClr val="accent1">
-              <a:shade val="50000"/>
-            </a:schemeClr>
-          </a:lnRef>
-          <a:fillRef idx="1">
-            <a:schemeClr val="accent1"/>
-          </a:fillRef>
-          <a:effectRef idx="0">
-            <a:schemeClr val="accent1"/>
-          </a:effectRef>
-          <a:fontRef idx="minor">
-            <a:schemeClr val="lt1"/>
-          </a:fontRef>
-        </p:style>
-        <p:txBody>
-          <a:bodyPr>
-            <a:normAutofit fontScale="90000"/>
-          </a:bodyPr>
-          <a:lstStyle/>
-          <a:p>
-            <a:r>
-              <a:rPr lang="it-IT" dirty="0" smtClean="0"/>
-              <a:t>Design Pattern e principi di progettazione </a:t>
-            </a:r>
-            <a:endParaRPr lang="it-IT" dirty="0"/>
-          </a:p>
-        </p:txBody>
-      </p:sp>
-      <p:sp>
-        <p:nvSpPr>
-          <p:cNvPr id="4" name="Segnaposto contenuto 3"/>
-          <p:cNvSpPr>
-            <a:spLocks noGrp="1"/>
-          </p:cNvSpPr>
-          <p:nvPr>
-            <p:ph idx="1"/>
-          </p:nvPr>
-        </p:nvSpPr>
-        <p:spPr/>
-        <p:txBody>
-          <a:bodyPr>
             <a:normAutofit fontScale="85000" lnSpcReduction="20000"/>
           </a:bodyPr>
           <a:lstStyle/>
@@ -6482,104 +6358,46 @@
           <a:p>
             <a:r>
               <a:rPr lang="it-IT" dirty="0" smtClean="0"/>
-              <a:t>Documento dei requisiti</a:t>
-            </a:r>
-            <a:endParaRPr lang="it-IT" dirty="0"/>
-          </a:p>
-        </p:txBody>
-      </p:sp>
-      <p:sp>
-        <p:nvSpPr>
-          <p:cNvPr id="3" name="Segnaposto contenuto 2"/>
-          <p:cNvSpPr>
-            <a:spLocks noGrp="1"/>
-          </p:cNvSpPr>
+              <a:t>Casi d’uso</a:t>
+            </a:r>
+            <a:endParaRPr lang="it-IT" dirty="0"/>
+          </a:p>
+        </p:txBody>
+      </p:sp>
+      <p:pic>
+        <p:nvPicPr>
+          <p:cNvPr id="1026" name="Picture 2"/>
+          <p:cNvPicPr>
+            <a:picLocks noGrp="1" noChangeAspect="1" noChangeArrowheads="1"/>
+          </p:cNvPicPr>
           <p:nvPr>
             <p:ph idx="1"/>
           </p:nvPr>
-        </p:nvSpPr>
-        <p:spPr/>
-        <p:txBody>
-          <a:bodyPr>
-            <a:normAutofit fontScale="85000" lnSpcReduction="20000"/>
-          </a:bodyPr>
-          <a:lstStyle/>
-          <a:p>
-            <a:pPr>
-              <a:buNone/>
-            </a:pPr>
-            <a:r>
-              <a:rPr lang="it-IT" b="1" i="1" dirty="0" smtClean="0"/>
-              <a:t>Momento </a:t>
-            </a:r>
-            <a:r>
-              <a:rPr lang="it-IT" b="1" i="1" dirty="0" smtClean="0"/>
-              <a:t>finale:</a:t>
-            </a:r>
-            <a:endParaRPr lang="it-IT" dirty="0" smtClean="0"/>
-          </a:p>
-          <a:p>
-            <a:pPr>
-              <a:buNone/>
-            </a:pPr>
-            <a:r>
-              <a:rPr lang="it-IT" dirty="0" smtClean="0"/>
-              <a:t>Il gioco termina quando un giocatore raggiunge il proprio obiettivo segreto.</a:t>
-            </a:r>
-          </a:p>
-          <a:p>
-            <a:pPr>
-              <a:buNone/>
-            </a:pPr>
-            <a:r>
-              <a:rPr lang="it-IT" dirty="0" smtClean="0"/>
-              <a:t> </a:t>
-            </a:r>
-          </a:p>
-          <a:p>
-            <a:pPr>
-              <a:buNone/>
-            </a:pPr>
-            <a:r>
-              <a:rPr lang="it-IT" i="1" u="sng" dirty="0" smtClean="0"/>
-              <a:t>Dettagli aggiuntivi:</a:t>
-            </a:r>
-            <a:endParaRPr lang="it-IT" dirty="0" smtClean="0"/>
-          </a:p>
-          <a:p>
-            <a:pPr>
-              <a:buNone/>
-            </a:pPr>
-            <a:r>
-              <a:rPr lang="it-IT" dirty="0" smtClean="0"/>
-              <a:t>Gli obiettivi possono essere di diverso tipo (es.: conquistare un certo numero di  territori, conquistare certi continenti, sconfiggere un certo giocatore </a:t>
-            </a:r>
-            <a:r>
-              <a:rPr lang="it-IT" dirty="0" err="1" smtClean="0"/>
-              <a:t>etc</a:t>
-            </a:r>
-            <a:r>
-              <a:rPr lang="it-IT" dirty="0" smtClean="0"/>
-              <a:t>).</a:t>
-            </a:r>
-          </a:p>
-          <a:p>
-            <a:pPr>
-              <a:buNone/>
-            </a:pPr>
-            <a:r>
-              <a:rPr lang="it-IT" dirty="0" smtClean="0"/>
-              <a:t>Il momento di gioco viene effettuato in sequenza dai giocatori, in maniera ciclica fino al raggiungimento della fase finale.</a:t>
-            </a:r>
-          </a:p>
-          <a:p>
-            <a:pPr>
-              <a:buNone/>
-            </a:pPr>
-            <a:endParaRPr lang="it-IT" dirty="0"/>
-          </a:p>
-        </p:txBody>
-      </p:sp>
+        </p:nvPicPr>
+        <p:blipFill>
+          <a:blip r:embed="rId2" cstate="print"/>
+          <a:srcRect/>
+          <a:stretch>
+            <a:fillRect/>
+          </a:stretch>
+        </p:blipFill>
+        <p:spPr bwMode="auto">
+          <a:xfrm>
+            <a:off x="2299628" y="1600200"/>
+            <a:ext cx="4544743" cy="4525963"/>
+          </a:xfrm>
+          <a:prstGeom prst="rect">
+            <a:avLst/>
+          </a:prstGeom>
+          <a:noFill/>
+          <a:ln w="9525">
+            <a:noFill/>
+            <a:miter lim="800000"/>
+            <a:headEnd/>
+            <a:tailEnd/>
+          </a:ln>
+        </p:spPr>
+      </p:pic>
     </p:spTree>
   </p:cSld>
   <p:clrMapOvr>
@@ -6646,7 +6464,7 @@
       </p:sp>
       <p:pic>
         <p:nvPicPr>
-          <p:cNvPr id="1026" name="Picture 2"/>
+          <p:cNvPr id="2050" name="Picture 2"/>
           <p:cNvPicPr>
             <a:picLocks noGrp="1" noChangeAspect="1" noChangeArrowheads="1"/>
           </p:cNvPicPr>
@@ -6663,8 +6481,8 @@
         </p:blipFill>
         <p:spPr bwMode="auto">
           <a:xfrm>
-            <a:off x="2299628" y="1600200"/>
-            <a:ext cx="4544743" cy="4525963"/>
+            <a:off x="2671762" y="2377281"/>
+            <a:ext cx="3800475" cy="2971800"/>
           </a:xfrm>
           <a:prstGeom prst="rect">
             <a:avLst/>
@@ -6736,7 +6554,7 @@
           <a:p>
             <a:r>
               <a:rPr lang="it-IT" dirty="0" smtClean="0"/>
-              <a:t>Casi d’uso</a:t>
+              <a:t>Scenari</a:t>
             </a:r>
             <a:endParaRPr lang="it-IT" dirty="0"/>
           </a:p>
@@ -6744,7 +6562,7 @@
       </p:sp>
       <p:pic>
         <p:nvPicPr>
-          <p:cNvPr id="2050" name="Picture 2"/>
+          <p:cNvPr id="3076" name="Picture 4"/>
           <p:cNvPicPr>
             <a:picLocks noGrp="1" noChangeAspect="1" noChangeArrowheads="1"/>
           </p:cNvPicPr>
@@ -6761,8 +6579,8 @@
         </p:blipFill>
         <p:spPr bwMode="auto">
           <a:xfrm>
-            <a:off x="2671762" y="2377281"/>
-            <a:ext cx="3800475" cy="2971800"/>
+            <a:off x="2384561" y="1600200"/>
+            <a:ext cx="4374878" cy="4525963"/>
           </a:xfrm>
           <a:prstGeom prst="rect">
             <a:avLst/>
@@ -6774,6 +6592,7 @@
             <a:headEnd/>
             <a:tailEnd/>
           </a:ln>
+          <a:effectLst/>
         </p:spPr>
       </p:pic>
     </p:spTree>

</xml_diff>